<commit_message>
more optimizations for POC
</commit_message>
<xml_diff>
--- a/presentation/Solution_Labettor.pptx
+++ b/presentation/Solution_Labettor.pptx
@@ -6,15 +6,14 @@
   </p:sldMasterIdLst>
   <p:sldIdLst>
     <p:sldId id="256" r:id="rId2"/>
-    <p:sldId id="257" r:id="rId3"/>
-    <p:sldId id="258" r:id="rId4"/>
-    <p:sldId id="259" r:id="rId5"/>
-    <p:sldId id="260" r:id="rId6"/>
-    <p:sldId id="261" r:id="rId7"/>
-    <p:sldId id="262" r:id="rId8"/>
-    <p:sldId id="263" r:id="rId9"/>
-    <p:sldId id="264" r:id="rId10"/>
-    <p:sldId id="265" r:id="rId11"/>
+    <p:sldId id="258" r:id="rId3"/>
+    <p:sldId id="259" r:id="rId4"/>
+    <p:sldId id="260" r:id="rId5"/>
+    <p:sldId id="261" r:id="rId6"/>
+    <p:sldId id="262" r:id="rId7"/>
+    <p:sldId id="263" r:id="rId8"/>
+    <p:sldId id="264" r:id="rId9"/>
+    <p:sldId id="265" r:id="rId10"/>
   </p:sldIdLst>
   <p:sldSz cx="12192000" cy="6858000"/>
   <p:notesSz cx="6858000" cy="9144000"/>
@@ -308,7 +307,7 @@
           <a:p>
             <a:fld id="{4AAD347D-5ACD-4C99-B74B-A9C85AD731AF}" type="datetimeFigureOut">
               <a:rPr lang="en-US" smtClean="0"/>
-              <a:t>7/19/2018</a:t>
+              <a:t>7/23/2018</a:t>
             </a:fld>
             <a:endParaRPr lang="en-US" dirty="0"/>
           </a:p>
@@ -583,7 +582,7 @@
           <a:p>
             <a:fld id="{4509A250-FF31-4206-8172-F9D3106AACB1}" type="datetimeFigureOut">
               <a:rPr lang="en-US" smtClean="0"/>
-              <a:t>7/19/2018</a:t>
+              <a:t>7/23/2018</a:t>
             </a:fld>
             <a:endParaRPr lang="en-US" dirty="0"/>
           </a:p>
@@ -777,7 +776,7 @@
           <a:p>
             <a:fld id="{4509A250-FF31-4206-8172-F9D3106AACB1}" type="datetimeFigureOut">
               <a:rPr lang="en-US" smtClean="0"/>
-              <a:t>7/19/2018</a:t>
+              <a:t>7/23/2018</a:t>
             </a:fld>
             <a:endParaRPr lang="en-US" dirty="0"/>
           </a:p>
@@ -1045,7 +1044,7 @@
           <a:p>
             <a:fld id="{4AAD347D-5ACD-4C99-B74B-A9C85AD731AF}" type="datetimeFigureOut">
               <a:rPr lang="en-US" smtClean="0"/>
-              <a:t>7/19/2018</a:t>
+              <a:t>7/23/2018</a:t>
             </a:fld>
             <a:endParaRPr lang="en-US" dirty="0"/>
           </a:p>
@@ -1378,7 +1377,7 @@
           <a:p>
             <a:fld id="{4509A250-FF31-4206-8172-F9D3106AACB1}" type="datetimeFigureOut">
               <a:rPr lang="en-US" smtClean="0"/>
-              <a:t>7/19/2018</a:t>
+              <a:t>7/23/2018</a:t>
             </a:fld>
             <a:endParaRPr lang="en-US" dirty="0"/>
           </a:p>
@@ -1988,7 +1987,7 @@
           <a:p>
             <a:fld id="{4509A250-FF31-4206-8172-F9D3106AACB1}" type="datetimeFigureOut">
               <a:rPr lang="en-US" smtClean="0"/>
-              <a:t>7/19/2018</a:t>
+              <a:t>7/23/2018</a:t>
             </a:fld>
             <a:endParaRPr lang="en-US" dirty="0"/>
           </a:p>
@@ -2835,7 +2834,7 @@
           <a:p>
             <a:fld id="{4509A250-FF31-4206-8172-F9D3106AACB1}" type="datetimeFigureOut">
               <a:rPr lang="en-US" smtClean="0"/>
-              <a:t>7/19/2018</a:t>
+              <a:t>7/23/2018</a:t>
             </a:fld>
             <a:endParaRPr lang="en-US" dirty="0"/>
           </a:p>
@@ -3005,7 +3004,7 @@
           <a:p>
             <a:fld id="{4509A250-FF31-4206-8172-F9D3106AACB1}" type="datetimeFigureOut">
               <a:rPr lang="en-US" smtClean="0"/>
-              <a:t>7/19/2018</a:t>
+              <a:t>7/23/2018</a:t>
             </a:fld>
             <a:endParaRPr lang="en-US" dirty="0"/>
           </a:p>
@@ -3185,7 +3184,7 @@
           <a:p>
             <a:fld id="{4509A250-FF31-4206-8172-F9D3106AACB1}" type="datetimeFigureOut">
               <a:rPr lang="en-US" smtClean="0"/>
-              <a:t>7/19/2018</a:t>
+              <a:t>7/23/2018</a:t>
             </a:fld>
             <a:endParaRPr lang="en-US" dirty="0"/>
           </a:p>
@@ -3355,7 +3354,7 @@
           <a:p>
             <a:fld id="{4509A250-FF31-4206-8172-F9D3106AACB1}" type="datetimeFigureOut">
               <a:rPr lang="en-US" smtClean="0"/>
-              <a:t>7/19/2018</a:t>
+              <a:t>7/23/2018</a:t>
             </a:fld>
             <a:endParaRPr lang="en-US" dirty="0"/>
           </a:p>
@@ -3599,7 +3598,7 @@
           <a:p>
             <a:fld id="{9796027F-7875-4030-9381-8BD8C4F21935}" type="datetimeFigureOut">
               <a:rPr lang="en-US" smtClean="0"/>
-              <a:t>7/19/2018</a:t>
+              <a:t>7/23/2018</a:t>
             </a:fld>
             <a:endParaRPr lang="en-US" dirty="0"/>
           </a:p>
@@ -3891,7 +3890,7 @@
           <a:p>
             <a:fld id="{9796027F-7875-4030-9381-8BD8C4F21935}" type="datetimeFigureOut">
               <a:rPr lang="en-US" smtClean="0"/>
-              <a:t>7/19/2018</a:t>
+              <a:t>7/23/2018</a:t>
             </a:fld>
             <a:endParaRPr lang="en-US" dirty="0"/>
           </a:p>
@@ -4329,7 +4328,7 @@
           <a:p>
             <a:fld id="{9796027F-7875-4030-9381-8BD8C4F21935}" type="datetimeFigureOut">
               <a:rPr lang="en-US" smtClean="0"/>
-              <a:t>7/19/2018</a:t>
+              <a:t>7/23/2018</a:t>
             </a:fld>
             <a:endParaRPr lang="en-US" dirty="0"/>
           </a:p>
@@ -4447,7 +4446,7 @@
           <a:p>
             <a:fld id="{4509A250-FF31-4206-8172-F9D3106AACB1}" type="datetimeFigureOut">
               <a:rPr lang="en-US" smtClean="0"/>
-              <a:t>7/19/2018</a:t>
+              <a:t>7/23/2018</a:t>
             </a:fld>
             <a:endParaRPr lang="en-US" dirty="0"/>
           </a:p>
@@ -4542,7 +4541,7 @@
           <a:p>
             <a:fld id="{4509A250-FF31-4206-8172-F9D3106AACB1}" type="datetimeFigureOut">
               <a:rPr lang="en-US" smtClean="0"/>
-              <a:t>7/19/2018</a:t>
+              <a:t>7/23/2018</a:t>
             </a:fld>
             <a:endParaRPr lang="en-US" dirty="0"/>
           </a:p>
@@ -4821,7 +4820,7 @@
           <a:p>
             <a:fld id="{4509A250-FF31-4206-8172-F9D3106AACB1}" type="datetimeFigureOut">
               <a:rPr lang="en-US" smtClean="0"/>
-              <a:t>7/19/2018</a:t>
+              <a:t>7/23/2018</a:t>
             </a:fld>
             <a:endParaRPr lang="en-US" dirty="0"/>
           </a:p>
@@ -5096,7 +5095,7 @@
           <a:p>
             <a:fld id="{4509A250-FF31-4206-8172-F9D3106AACB1}" type="datetimeFigureOut">
               <a:rPr lang="en-US" smtClean="0"/>
-              <a:t>7/19/2018</a:t>
+              <a:t>7/23/2018</a:t>
             </a:fld>
             <a:endParaRPr lang="en-US" dirty="0"/>
           </a:p>
@@ -5525,7 +5524,7 @@
           <a:p>
             <a:fld id="{4AAD347D-5ACD-4C99-B74B-A9C85AD731AF}" type="datetimeFigureOut">
               <a:rPr lang="en-US" smtClean="0"/>
-              <a:t>7/19/2018</a:t>
+              <a:t>7/23/2018</a:t>
             </a:fld>
             <a:endParaRPr lang="en-US" dirty="0"/>
           </a:p>
@@ -6128,90 +6127,6 @@
 </p:sld>
 </file>
 
-<file path=ppt/slides/slide10.xml><?xml version="1.0" encoding="utf-8"?>
-<p:sld xmlns:a="http://schemas.openxmlformats.org/drawingml/2006/main" xmlns:r="http://schemas.openxmlformats.org/officeDocument/2006/relationships" xmlns:p="http://schemas.openxmlformats.org/presentationml/2006/main">
-  <p:cSld>
-    <p:spTree>
-      <p:nvGrpSpPr>
-        <p:cNvPr id="1" name=""/>
-        <p:cNvGrpSpPr/>
-        <p:nvPr/>
-      </p:nvGrpSpPr>
-      <p:grpSpPr>
-        <a:xfrm>
-          <a:off x="0" y="0"/>
-          <a:ext cx="0" cy="0"/>
-          <a:chOff x="0" y="0"/>
-          <a:chExt cx="0" cy="0"/>
-        </a:xfrm>
-      </p:grpSpPr>
-      <p:sp>
-        <p:nvSpPr>
-          <p:cNvPr id="2" name="Title 1"/>
-          <p:cNvSpPr>
-            <a:spLocks noGrp="1"/>
-          </p:cNvSpPr>
-          <p:nvPr>
-            <p:ph type="title"/>
-          </p:nvPr>
-        </p:nvSpPr>
-        <p:spPr>
-          <a:xfrm>
-            <a:off x="612860" y="3179291"/>
-            <a:ext cx="9404723" cy="1400530"/>
-          </a:xfrm>
-        </p:spPr>
-        <p:txBody>
-          <a:bodyPr/>
-          <a:lstStyle/>
-          <a:p>
-            <a:pPr algn="ctr"/>
-            <a:r>
-              <a:rPr lang="nl-NL" dirty="0" err="1" smtClean="0"/>
-              <a:t>Thoughts</a:t>
-            </a:r>
-            <a:r>
-              <a:rPr lang="nl-NL" dirty="0" smtClean="0"/>
-              <a:t>?</a:t>
-            </a:r>
-            <a:br>
-              <a:rPr lang="nl-NL" dirty="0" smtClean="0"/>
-            </a:br>
-            <a:r>
-              <a:rPr lang="nl-NL" dirty="0" smtClean="0"/>
-              <a:t/>
-            </a:r>
-            <a:br>
-              <a:rPr lang="nl-NL" dirty="0" smtClean="0"/>
-            </a:br>
-            <a:r>
-              <a:rPr lang="nl-NL" sz="1600" dirty="0" smtClean="0"/>
-              <a:t>ravishbhupesh@gmail.com</a:t>
-            </a:r>
-            <a:endParaRPr lang="nl-NL" sz="1600" dirty="0"/>
-          </a:p>
-        </p:txBody>
-      </p:sp>
-    </p:spTree>
-    <p:extLst>
-      <p:ext uri="{BB962C8B-B14F-4D97-AF65-F5344CB8AC3E}">
-        <p14:creationId xmlns:p14="http://schemas.microsoft.com/office/powerpoint/2010/main" val="1438573049"/>
-      </p:ext>
-    </p:extLst>
-  </p:cSld>
-  <p:clrMapOvr>
-    <a:masterClrMapping/>
-  </p:clrMapOvr>
-  <p:timing>
-    <p:tnLst>
-      <p:par>
-        <p:cTn id="1" dur="indefinite" restart="never" nodeType="tmRoot"/>
-      </p:par>
-    </p:tnLst>
-  </p:timing>
-</p:sld>
-</file>
-
 <file path=ppt/slides/slide2.xml><?xml version="1.0" encoding="utf-8"?>
 <p:sld xmlns:a="http://schemas.openxmlformats.org/drawingml/2006/main" xmlns:r="http://schemas.openxmlformats.org/officeDocument/2006/relationships" xmlns:p="http://schemas.openxmlformats.org/presentationml/2006/main">
   <p:cSld>
@@ -6234,7 +6149,7 @@
           <p:cNvPr id="2" name="Title 1">
             <a:extLst>
               <a:ext uri="{FF2B5EF4-FFF2-40B4-BE49-F238E27FC236}">
-                <a16:creationId xmlns:a16="http://schemas.microsoft.com/office/drawing/2014/main" id="{0CAB30A6-DD40-40F1-A421-A4B20BEA3C0F}"/>
+                <a16:creationId xmlns:a16="http://schemas.microsoft.com/office/drawing/2014/main" id="{9BECEF53-7405-449C-A1FD-D1EE68427DDE}"/>
               </a:ext>
             </a:extLst>
           </p:cNvPr>
@@ -6251,9 +6166,18 @@
           <a:lstStyle/>
           <a:p>
             <a:r>
+              <a:rPr lang="nl-NL" dirty="0" err="1"/>
+              <a:t>Current</a:t>
+            </a:r>
+            <a:r>
               <a:rPr lang="nl-NL" dirty="0"/>
-              <a:t>Agenda</a:t>
-            </a:r>
+              <a:t> </a:t>
+            </a:r>
+            <a:r>
+              <a:rPr lang="nl-NL" dirty="0" err="1" smtClean="0"/>
+              <a:t>Situation</a:t>
+            </a:r>
+            <a:endParaRPr lang="nl-NL" dirty="0"/>
           </a:p>
         </p:txBody>
       </p:sp>
@@ -6262,7 +6186,7 @@
           <p:cNvPr id="3" name="Content Placeholder 2">
             <a:extLst>
               <a:ext uri="{FF2B5EF4-FFF2-40B4-BE49-F238E27FC236}">
-                <a16:creationId xmlns:a16="http://schemas.microsoft.com/office/drawing/2014/main" id="{6CC18FB0-D936-40B7-8F02-F1973E3D5398}"/>
+                <a16:creationId xmlns:a16="http://schemas.microsoft.com/office/drawing/2014/main" id="{3034EE38-2C25-4186-B4A6-7BD1566A77CD}"/>
               </a:ext>
             </a:extLst>
           </p:cNvPr>
@@ -6278,14 +6202,74 @@
           <a:bodyPr/>
           <a:lstStyle/>
           <a:p>
-            <a:endParaRPr lang="nl-NL"/>
+            <a:r>
+              <a:rPr lang="nl-NL" dirty="0" smtClean="0"/>
+              <a:t>Journal </a:t>
+            </a:r>
+            <a:r>
+              <a:rPr lang="nl-NL" dirty="0" err="1" smtClean="0"/>
+              <a:t>Mining</a:t>
+            </a:r>
+            <a:r>
+              <a:rPr lang="nl-NL" dirty="0" smtClean="0"/>
+              <a:t> is </a:t>
+            </a:r>
+            <a:r>
+              <a:rPr lang="nl-NL" dirty="0" err="1" smtClean="0"/>
+              <a:t>not</a:t>
+            </a:r>
+            <a:r>
+              <a:rPr lang="nl-NL" dirty="0" smtClean="0"/>
+              <a:t> easy…</a:t>
+            </a:r>
+          </a:p>
+          <a:p>
+            <a:pPr lvl="1"/>
+            <a:r>
+              <a:rPr lang="nl-NL" dirty="0" err="1" smtClean="0"/>
+              <a:t>All</a:t>
+            </a:r>
+            <a:r>
+              <a:rPr lang="nl-NL" dirty="0" smtClean="0"/>
+              <a:t> </a:t>
+            </a:r>
+            <a:r>
+              <a:rPr lang="nl-NL" dirty="0"/>
+              <a:t>Manual effort.</a:t>
+            </a:r>
+          </a:p>
+          <a:p>
+            <a:pPr lvl="1"/>
+            <a:r>
+              <a:rPr lang="nl-NL" dirty="0"/>
+              <a:t>Time consuming.</a:t>
+            </a:r>
+          </a:p>
+          <a:p>
+            <a:pPr lvl="1"/>
+            <a:r>
+              <a:rPr lang="nl-NL" dirty="0"/>
+              <a:t>Error </a:t>
+            </a:r>
+            <a:r>
+              <a:rPr lang="nl-NL" dirty="0" err="1" smtClean="0"/>
+              <a:t>Prone</a:t>
+            </a:r>
+            <a:r>
+              <a:rPr lang="nl-NL" dirty="0" smtClean="0"/>
+              <a:t>(Human).</a:t>
+            </a:r>
+            <a:endParaRPr lang="nl-NL" dirty="0"/>
+          </a:p>
+          <a:p>
+            <a:endParaRPr lang="nl-NL" dirty="0"/>
           </a:p>
         </p:txBody>
       </p:sp>
     </p:spTree>
     <p:extLst>
       <p:ext uri="{BB962C8B-B14F-4D97-AF65-F5344CB8AC3E}">
-        <p14:creationId xmlns:p14="http://schemas.microsoft.com/office/powerpoint/2010/main" val="145213770"/>
+        <p14:creationId xmlns:p14="http://schemas.microsoft.com/office/powerpoint/2010/main" val="3760900878"/>
       </p:ext>
     </p:extLst>
   </p:cSld>
@@ -6324,7 +6308,7 @@
           <p:cNvPr id="2" name="Title 1">
             <a:extLst>
               <a:ext uri="{FF2B5EF4-FFF2-40B4-BE49-F238E27FC236}">
-                <a16:creationId xmlns:a16="http://schemas.microsoft.com/office/drawing/2014/main" id="{9BECEF53-7405-449C-A1FD-D1EE68427DDE}"/>
+                <a16:creationId xmlns:a16="http://schemas.microsoft.com/office/drawing/2014/main" id="{BED559B3-199F-4882-9AF9-7C8C795B42E6}"/>
               </a:ext>
             </a:extLst>
           </p:cNvPr>
@@ -6341,8 +6325,16 @@
           <a:lstStyle/>
           <a:p>
             <a:r>
+              <a:rPr lang="nl-NL" dirty="0" err="1" smtClean="0"/>
+              <a:t>Possible</a:t>
+            </a:r>
+            <a:r>
+              <a:rPr lang="nl-NL" dirty="0" smtClean="0"/>
+              <a:t> </a:t>
+            </a:r>
+            <a:r>
               <a:rPr lang="nl-NL" dirty="0"/>
-              <a:t>Current Situation/Problems?</a:t>
+              <a:t>Solution</a:t>
             </a:r>
           </a:p>
         </p:txBody>
@@ -6352,7 +6344,7 @@
           <p:cNvPr id="3" name="Content Placeholder 2">
             <a:extLst>
               <a:ext uri="{FF2B5EF4-FFF2-40B4-BE49-F238E27FC236}">
-                <a16:creationId xmlns:a16="http://schemas.microsoft.com/office/drawing/2014/main" id="{3034EE38-2C25-4186-B4A6-7BD1566A77CD}"/>
+                <a16:creationId xmlns:a16="http://schemas.microsoft.com/office/drawing/2014/main" id="{B6B7F014-7A72-48D1-A969-FC8F8F398543}"/>
               </a:ext>
             </a:extLst>
           </p:cNvPr>
@@ -6369,65 +6361,51 @@
           <a:lstStyle/>
           <a:p>
             <a:r>
-              <a:rPr lang="nl-NL" dirty="0" smtClean="0"/>
-              <a:t>Journal </a:t>
-            </a:r>
-            <a:r>
-              <a:rPr lang="nl-NL" dirty="0" err="1" smtClean="0"/>
-              <a:t>Mining</a:t>
-            </a:r>
-            <a:r>
-              <a:rPr lang="nl-NL" dirty="0" smtClean="0"/>
-              <a:t> is </a:t>
-            </a:r>
-            <a:r>
-              <a:rPr lang="nl-NL" dirty="0" err="1" smtClean="0"/>
-              <a:t>not</a:t>
-            </a:r>
-            <a:r>
-              <a:rPr lang="nl-NL" dirty="0" smtClean="0"/>
-              <a:t> easy…</a:t>
+              <a:rPr lang="nl-NL" dirty="0"/>
+              <a:t>Create a Journal Mining module.</a:t>
             </a:r>
           </a:p>
           <a:p>
             <a:pPr lvl="1"/>
             <a:r>
-              <a:rPr lang="nl-NL" dirty="0" err="1" smtClean="0"/>
-              <a:t>All</a:t>
-            </a:r>
-            <a:r>
-              <a:rPr lang="nl-NL" dirty="0" smtClean="0"/>
-              <a:t> </a:t>
-            </a:r>
-            <a:r>
               <a:rPr lang="nl-NL" dirty="0"/>
-              <a:t>Manual effort.</a:t>
+              <a:t>API Based – NCBI.</a:t>
             </a:r>
           </a:p>
           <a:p>
             <a:pPr lvl="1"/>
             <a:r>
               <a:rPr lang="nl-NL" dirty="0"/>
-              <a:t>Time consuming.</a:t>
+              <a:t>Less Manual Effort.</a:t>
+            </a:r>
+          </a:p>
+          <a:p>
+            <a:pPr lvl="2"/>
+            <a:r>
+              <a:rPr lang="nl-NL" dirty="0"/>
+              <a:t>Possible No Manual Effort in Future.</a:t>
             </a:r>
           </a:p>
           <a:p>
             <a:pPr lvl="1"/>
             <a:r>
               <a:rPr lang="nl-NL" dirty="0"/>
-              <a:t>Error </a:t>
-            </a:r>
-            <a:r>
-              <a:rPr lang="nl-NL" dirty="0" err="1" smtClean="0"/>
-              <a:t>Prone</a:t>
-            </a:r>
-            <a:r>
-              <a:rPr lang="nl-NL" dirty="0" smtClean="0"/>
-              <a:t>(Human).</a:t>
-            </a:r>
+              <a:t>Less Time Consuming.</a:t>
+            </a:r>
+          </a:p>
+          <a:p>
+            <a:pPr lvl="1"/>
+            <a:r>
+              <a:rPr lang="nl-NL" dirty="0"/>
+              <a:t>Less Error Prone.</a:t>
+            </a:r>
+          </a:p>
+          <a:p>
+            <a:pPr lvl="1"/>
             <a:endParaRPr lang="nl-NL" dirty="0"/>
           </a:p>
           <a:p>
+            <a:pPr lvl="1"/>
             <a:endParaRPr lang="nl-NL" dirty="0"/>
           </a:p>
         </p:txBody>
@@ -6435,7 +6413,7 @@
     </p:spTree>
     <p:extLst>
       <p:ext uri="{BB962C8B-B14F-4D97-AF65-F5344CB8AC3E}">
-        <p14:creationId xmlns:p14="http://schemas.microsoft.com/office/powerpoint/2010/main" val="3760900878"/>
+        <p14:creationId xmlns:p14="http://schemas.microsoft.com/office/powerpoint/2010/main" val="858238806"/>
       </p:ext>
     </p:extLst>
   </p:cSld>
@@ -6474,142 +6452,6 @@
           <p:cNvPr id="2" name="Title 1">
             <a:extLst>
               <a:ext uri="{FF2B5EF4-FFF2-40B4-BE49-F238E27FC236}">
-                <a16:creationId xmlns:a16="http://schemas.microsoft.com/office/drawing/2014/main" id="{BED559B3-199F-4882-9AF9-7C8C795B42E6}"/>
-              </a:ext>
-            </a:extLst>
-          </p:cNvPr>
-          <p:cNvSpPr>
-            <a:spLocks noGrp="1"/>
-          </p:cNvSpPr>
-          <p:nvPr>
-            <p:ph type="title"/>
-          </p:nvPr>
-        </p:nvSpPr>
-        <p:spPr/>
-        <p:txBody>
-          <a:bodyPr/>
-          <a:lstStyle/>
-          <a:p>
-            <a:r>
-              <a:rPr lang="nl-NL" dirty="0"/>
-              <a:t>Proposed Solution</a:t>
-            </a:r>
-          </a:p>
-        </p:txBody>
-      </p:sp>
-      <p:sp>
-        <p:nvSpPr>
-          <p:cNvPr id="3" name="Content Placeholder 2">
-            <a:extLst>
-              <a:ext uri="{FF2B5EF4-FFF2-40B4-BE49-F238E27FC236}">
-                <a16:creationId xmlns:a16="http://schemas.microsoft.com/office/drawing/2014/main" id="{B6B7F014-7A72-48D1-A969-FC8F8F398543}"/>
-              </a:ext>
-            </a:extLst>
-          </p:cNvPr>
-          <p:cNvSpPr>
-            <a:spLocks noGrp="1"/>
-          </p:cNvSpPr>
-          <p:nvPr>
-            <p:ph idx="1"/>
-          </p:nvPr>
-        </p:nvSpPr>
-        <p:spPr/>
-        <p:txBody>
-          <a:bodyPr/>
-          <a:lstStyle/>
-          <a:p>
-            <a:r>
-              <a:rPr lang="nl-NL" dirty="0"/>
-              <a:t>Create a Journal Mining module.</a:t>
-            </a:r>
-          </a:p>
-          <a:p>
-            <a:pPr lvl="1"/>
-            <a:r>
-              <a:rPr lang="nl-NL" dirty="0"/>
-              <a:t>API Based – NCBI.</a:t>
-            </a:r>
-          </a:p>
-          <a:p>
-            <a:pPr lvl="1"/>
-            <a:r>
-              <a:rPr lang="nl-NL" dirty="0"/>
-              <a:t>Less Manual Effort.</a:t>
-            </a:r>
-          </a:p>
-          <a:p>
-            <a:pPr lvl="2"/>
-            <a:r>
-              <a:rPr lang="nl-NL" dirty="0"/>
-              <a:t>Possible No Manual Effort in Future.</a:t>
-            </a:r>
-          </a:p>
-          <a:p>
-            <a:pPr lvl="1"/>
-            <a:r>
-              <a:rPr lang="nl-NL" dirty="0"/>
-              <a:t>Less Time Consuming.</a:t>
-            </a:r>
-          </a:p>
-          <a:p>
-            <a:pPr lvl="1"/>
-            <a:r>
-              <a:rPr lang="nl-NL" dirty="0"/>
-              <a:t>Less Error Prone.</a:t>
-            </a:r>
-          </a:p>
-          <a:p>
-            <a:pPr lvl="1"/>
-            <a:endParaRPr lang="nl-NL" dirty="0"/>
-          </a:p>
-          <a:p>
-            <a:pPr lvl="1"/>
-            <a:endParaRPr lang="nl-NL" dirty="0"/>
-          </a:p>
-        </p:txBody>
-      </p:sp>
-    </p:spTree>
-    <p:extLst>
-      <p:ext uri="{BB962C8B-B14F-4D97-AF65-F5344CB8AC3E}">
-        <p14:creationId xmlns:p14="http://schemas.microsoft.com/office/powerpoint/2010/main" val="858238806"/>
-      </p:ext>
-    </p:extLst>
-  </p:cSld>
-  <p:clrMapOvr>
-    <a:masterClrMapping/>
-  </p:clrMapOvr>
-  <p:timing>
-    <p:tnLst>
-      <p:par>
-        <p:cTn id="1" dur="indefinite" restart="never" nodeType="tmRoot"/>
-      </p:par>
-    </p:tnLst>
-  </p:timing>
-</p:sld>
-</file>
-
-<file path=ppt/slides/slide5.xml><?xml version="1.0" encoding="utf-8"?>
-<p:sld xmlns:a="http://schemas.openxmlformats.org/drawingml/2006/main" xmlns:r="http://schemas.openxmlformats.org/officeDocument/2006/relationships" xmlns:p="http://schemas.openxmlformats.org/presentationml/2006/main">
-  <p:cSld>
-    <p:spTree>
-      <p:nvGrpSpPr>
-        <p:cNvPr id="1" name=""/>
-        <p:cNvGrpSpPr/>
-        <p:nvPr/>
-      </p:nvGrpSpPr>
-      <p:grpSpPr>
-        <a:xfrm>
-          <a:off x="0" y="0"/>
-          <a:ext cx="0" cy="0"/>
-          <a:chOff x="0" y="0"/>
-          <a:chExt cx="0" cy="0"/>
-        </a:xfrm>
-      </p:grpSpPr>
-      <p:sp>
-        <p:nvSpPr>
-          <p:cNvPr id="2" name="Title 1">
-            <a:extLst>
-              <a:ext uri="{FF2B5EF4-FFF2-40B4-BE49-F238E27FC236}">
                 <a16:creationId xmlns:a16="http://schemas.microsoft.com/office/drawing/2014/main" id="{68621C80-552B-43E1-805C-48F225C4DB70}"/>
               </a:ext>
             </a:extLst>
@@ -6710,7 +6552,7 @@
 </p:sld>
 </file>
 
-<file path=ppt/slides/slide6.xml><?xml version="1.0" encoding="utf-8"?>
+<file path=ppt/slides/slide5.xml><?xml version="1.0" encoding="utf-8"?>
 <p:sld xmlns:a="http://schemas.openxmlformats.org/drawingml/2006/main" xmlns:r="http://schemas.openxmlformats.org/officeDocument/2006/relationships" xmlns:p="http://schemas.openxmlformats.org/presentationml/2006/main">
   <p:cSld>
     <p:spTree>
@@ -6804,6 +6646,126 @@
 </p:sld>
 </file>
 
+<file path=ppt/slides/slide6.xml><?xml version="1.0" encoding="utf-8"?>
+<p:sld xmlns:a="http://schemas.openxmlformats.org/drawingml/2006/main" xmlns:r="http://schemas.openxmlformats.org/officeDocument/2006/relationships" xmlns:p="http://schemas.openxmlformats.org/presentationml/2006/main">
+  <p:cSld>
+    <p:spTree>
+      <p:nvGrpSpPr>
+        <p:cNvPr id="1" name=""/>
+        <p:cNvGrpSpPr/>
+        <p:nvPr/>
+      </p:nvGrpSpPr>
+      <p:grpSpPr>
+        <a:xfrm>
+          <a:off x="0" y="0"/>
+          <a:ext cx="0" cy="0"/>
+          <a:chOff x="0" y="0"/>
+          <a:chExt cx="0" cy="0"/>
+        </a:xfrm>
+      </p:grpSpPr>
+      <p:sp>
+        <p:nvSpPr>
+          <p:cNvPr id="2" name="Title 1">
+            <a:extLst>
+              <a:ext uri="{FF2B5EF4-FFF2-40B4-BE49-F238E27FC236}">
+                <a16:creationId xmlns:a16="http://schemas.microsoft.com/office/drawing/2014/main" id="{457F4D11-C3A0-4CB7-8E70-A7EFC99EA1E3}"/>
+              </a:ext>
+            </a:extLst>
+          </p:cNvPr>
+          <p:cNvSpPr>
+            <a:spLocks noGrp="1"/>
+          </p:cNvSpPr>
+          <p:nvPr>
+            <p:ph type="title"/>
+          </p:nvPr>
+        </p:nvSpPr>
+        <p:spPr/>
+        <p:txBody>
+          <a:bodyPr/>
+          <a:lstStyle/>
+          <a:p>
+            <a:r>
+              <a:rPr lang="nl-NL" dirty="0"/>
+              <a:t>Solution POC</a:t>
+            </a:r>
+          </a:p>
+        </p:txBody>
+      </p:sp>
+      <p:sp>
+        <p:nvSpPr>
+          <p:cNvPr id="3" name="Content Placeholder 2">
+            <a:extLst>
+              <a:ext uri="{FF2B5EF4-FFF2-40B4-BE49-F238E27FC236}">
+                <a16:creationId xmlns:a16="http://schemas.microsoft.com/office/drawing/2014/main" id="{2CEFC4CE-A442-4B0B-A2CB-E8BB28343F22}"/>
+              </a:ext>
+            </a:extLst>
+          </p:cNvPr>
+          <p:cNvSpPr>
+            <a:spLocks noGrp="1"/>
+          </p:cNvSpPr>
+          <p:nvPr>
+            <p:ph idx="1"/>
+          </p:nvPr>
+        </p:nvSpPr>
+        <p:spPr/>
+        <p:txBody>
+          <a:bodyPr/>
+          <a:lstStyle/>
+          <a:p>
+            <a:r>
+              <a:rPr lang="nl-NL" dirty="0"/>
+              <a:t>Basic random search for keywords with timeframe of last 5 years.</a:t>
+            </a:r>
+          </a:p>
+          <a:p>
+            <a:r>
+              <a:rPr lang="nl-NL" dirty="0"/>
+              <a:t>Spring boot based </a:t>
+            </a:r>
+            <a:r>
+              <a:rPr lang="nl-NL" dirty="0" err="1"/>
+              <a:t>application</a:t>
+            </a:r>
+            <a:r>
+              <a:rPr lang="nl-NL" dirty="0" smtClean="0"/>
+              <a:t>.</a:t>
+            </a:r>
+            <a:endParaRPr lang="nl-NL" dirty="0"/>
+          </a:p>
+          <a:p>
+            <a:r>
+              <a:rPr lang="nl-NL" dirty="0"/>
+              <a:t>Web based endpoint to access the application.</a:t>
+            </a:r>
+          </a:p>
+          <a:p>
+            <a:r>
+              <a:rPr lang="nl-NL" dirty="0"/>
+              <a:t>No storage.</a:t>
+            </a:r>
+          </a:p>
+        </p:txBody>
+      </p:sp>
+    </p:spTree>
+    <p:extLst>
+      <p:ext uri="{BB962C8B-B14F-4D97-AF65-F5344CB8AC3E}">
+        <p14:creationId xmlns:p14="http://schemas.microsoft.com/office/powerpoint/2010/main" val="4211336109"/>
+      </p:ext>
+    </p:extLst>
+  </p:cSld>
+  <p:clrMapOvr>
+    <a:masterClrMapping/>
+  </p:clrMapOvr>
+  <p:timing>
+    <p:tnLst>
+      <p:par>
+        <p:cTn id="1" dur="indefinite" restart="never" nodeType="tmRoot"/>
+      </p:par>
+    </p:tnLst>
+  </p:timing>
+</p:sld>
+</file>
+
 <file path=ppt/slides/slide7.xml><?xml version="1.0" encoding="utf-8"?>
 <p:sld xmlns:a="http://schemas.openxmlformats.org/drawingml/2006/main" xmlns:r="http://schemas.openxmlformats.org/officeDocument/2006/relationships" xmlns:p="http://schemas.openxmlformats.org/presentationml/2006/main">
   <p:cSld>
@@ -6826,7 +6788,7 @@
           <p:cNvPr id="2" name="Title 1">
             <a:extLst>
               <a:ext uri="{FF2B5EF4-FFF2-40B4-BE49-F238E27FC236}">
-                <a16:creationId xmlns:a16="http://schemas.microsoft.com/office/drawing/2014/main" id="{457F4D11-C3A0-4CB7-8E70-A7EFC99EA1E3}"/>
+                <a16:creationId xmlns:a16="http://schemas.microsoft.com/office/drawing/2014/main" id="{CC8AC6DE-787B-4EEA-B1B1-5E404C85D282}"/>
               </a:ext>
             </a:extLst>
           </p:cNvPr>
@@ -6844,7 +6806,7 @@
           <a:p>
             <a:r>
               <a:rPr lang="nl-NL" dirty="0"/>
-              <a:t>Solution POC</a:t>
+              <a:t>Solution – In addition to POC</a:t>
             </a:r>
           </a:p>
         </p:txBody>
@@ -6854,7 +6816,7 @@
           <p:cNvPr id="3" name="Content Placeholder 2">
             <a:extLst>
               <a:ext uri="{FF2B5EF4-FFF2-40B4-BE49-F238E27FC236}">
-                <a16:creationId xmlns:a16="http://schemas.microsoft.com/office/drawing/2014/main" id="{2CEFC4CE-A442-4B0B-A2CB-E8BB28343F22}"/>
+                <a16:creationId xmlns:a16="http://schemas.microsoft.com/office/drawing/2014/main" id="{AF425634-5D54-47DE-86F2-5D4D6722D86A}"/>
               </a:ext>
             </a:extLst>
           </p:cNvPr>
@@ -6867,47 +6829,223 @@
         </p:nvSpPr>
         <p:spPr/>
         <p:txBody>
-          <a:bodyPr/>
-          <a:lstStyle/>
-          <a:p>
+          <a:bodyPr>
+            <a:normAutofit/>
+          </a:bodyPr>
+          <a:lstStyle/>
+          <a:p>
+            <a:r>
+              <a:rPr lang="nl-NL" dirty="0" smtClean="0"/>
+              <a:t>Database.</a:t>
+            </a:r>
+          </a:p>
+          <a:p>
+            <a:r>
+              <a:rPr lang="nl-NL" dirty="0" err="1"/>
+              <a:t>Detailed</a:t>
+            </a:r>
             <a:r>
               <a:rPr lang="nl-NL" dirty="0"/>
-              <a:t>Basic random search for keywords with timeframe of last 5 years.</a:t>
-            </a:r>
-          </a:p>
-          <a:p>
+              <a:t> Information </a:t>
+            </a:r>
+            <a:r>
+              <a:rPr lang="nl-NL" dirty="0" err="1"/>
+              <a:t>about</a:t>
+            </a:r>
             <a:r>
               <a:rPr lang="nl-NL" dirty="0"/>
-              <a:t>Spring boot based </a:t>
+              <a:t> </a:t>
             </a:r>
             <a:r>
               <a:rPr lang="nl-NL" dirty="0" err="1"/>
-              <a:t>application</a:t>
+              <a:t>the</a:t>
+            </a:r>
+            <a:r>
+              <a:rPr lang="nl-NL" dirty="0"/>
+              <a:t> </a:t>
+            </a:r>
+            <a:r>
+              <a:rPr lang="nl-NL" dirty="0" err="1"/>
+              <a:t>journals</a:t>
             </a:r>
             <a:r>
               <a:rPr lang="nl-NL" dirty="0" smtClean="0"/>
               <a:t>.</a:t>
             </a:r>
+          </a:p>
+          <a:p>
+            <a:r>
+              <a:rPr lang="nl-NL" dirty="0" err="1" smtClean="0"/>
+              <a:t>Pagination</a:t>
+            </a:r>
+            <a:r>
+              <a:rPr lang="nl-NL" dirty="0" smtClean="0"/>
+              <a:t>.</a:t>
+            </a:r>
+          </a:p>
+          <a:p>
+            <a:r>
+              <a:rPr lang="nl-NL" dirty="0" smtClean="0"/>
+              <a:t>Cloud Readiness.</a:t>
+            </a:r>
             <a:endParaRPr lang="nl-NL" dirty="0"/>
           </a:p>
           <a:p>
             <a:r>
               <a:rPr lang="nl-NL" dirty="0"/>
-              <a:t>Web based endpoint to access the application.</a:t>
-            </a:r>
-          </a:p>
-          <a:p>
+              <a:t>REST </a:t>
+            </a:r>
+            <a:r>
+              <a:rPr lang="nl-NL" dirty="0" err="1"/>
+              <a:t>based</a:t>
+            </a:r>
             <a:r>
               <a:rPr lang="nl-NL" dirty="0"/>
-              <a:t>No storage.</a:t>
-            </a:r>
+              <a:t> </a:t>
+            </a:r>
+            <a:r>
+              <a:rPr lang="nl-NL" dirty="0" err="1" smtClean="0"/>
+              <a:t>endpoint</a:t>
+            </a:r>
+            <a:r>
+              <a:rPr lang="nl-NL" dirty="0" smtClean="0"/>
+              <a:t>.</a:t>
+            </a:r>
+            <a:endParaRPr lang="nl-NL" dirty="0"/>
+          </a:p>
+          <a:p>
+            <a:pPr lvl="1"/>
+            <a:r>
+              <a:rPr lang="nl-NL" dirty="0"/>
+              <a:t>So existing application(Lab) can also connect </a:t>
+            </a:r>
+            <a:r>
+              <a:rPr lang="nl-NL" dirty="0" err="1"/>
+              <a:t>to</a:t>
+            </a:r>
+            <a:r>
+              <a:rPr lang="nl-NL" dirty="0" smtClean="0"/>
+              <a:t>.</a:t>
+            </a:r>
+          </a:p>
+          <a:p>
+            <a:r>
+              <a:rPr lang="nl-NL" dirty="0" smtClean="0"/>
+              <a:t>Solution </a:t>
+            </a:r>
+            <a:r>
+              <a:rPr lang="nl-NL" dirty="0" err="1" smtClean="0"/>
+              <a:t>will</a:t>
+            </a:r>
+            <a:r>
+              <a:rPr lang="nl-NL" dirty="0" smtClean="0"/>
+              <a:t> </a:t>
+            </a:r>
+            <a:r>
+              <a:rPr lang="nl-NL" dirty="0" err="1" smtClean="0"/>
+              <a:t>be</a:t>
+            </a:r>
+            <a:r>
+              <a:rPr lang="nl-NL" dirty="0" smtClean="0"/>
+              <a:t> a API </a:t>
+            </a:r>
+            <a:r>
+              <a:rPr lang="nl-NL" dirty="0" err="1" smtClean="0"/>
+              <a:t>which</a:t>
+            </a:r>
+            <a:r>
+              <a:rPr lang="nl-NL" dirty="0" smtClean="0"/>
+              <a:t> </a:t>
+            </a:r>
+            <a:r>
+              <a:rPr lang="nl-NL" dirty="0" err="1" smtClean="0"/>
+              <a:t>can</a:t>
+            </a:r>
+            <a:r>
+              <a:rPr lang="nl-NL" dirty="0" smtClean="0"/>
+              <a:t> </a:t>
+            </a:r>
+            <a:r>
+              <a:rPr lang="nl-NL" dirty="0" err="1" smtClean="0"/>
+              <a:t>be</a:t>
+            </a:r>
+            <a:r>
+              <a:rPr lang="nl-NL" dirty="0" smtClean="0"/>
+              <a:t> </a:t>
+            </a:r>
+            <a:r>
+              <a:rPr lang="nl-NL" dirty="0" err="1" smtClean="0"/>
+              <a:t>extended</a:t>
+            </a:r>
+            <a:r>
+              <a:rPr lang="nl-NL" dirty="0" smtClean="0"/>
+              <a:t> </a:t>
+            </a:r>
+            <a:r>
+              <a:rPr lang="nl-NL" dirty="0" err="1" smtClean="0"/>
+              <a:t>to</a:t>
+            </a:r>
+            <a:r>
+              <a:rPr lang="nl-NL" dirty="0" smtClean="0"/>
+              <a:t> multiple </a:t>
+            </a:r>
+            <a:r>
+              <a:rPr lang="nl-NL" dirty="0" err="1" smtClean="0"/>
+              <a:t>Journals</a:t>
+            </a:r>
+            <a:r>
+              <a:rPr lang="nl-NL" dirty="0" smtClean="0"/>
+              <a:t>, </a:t>
+            </a:r>
+            <a:r>
+              <a:rPr lang="nl-NL" dirty="0" err="1" smtClean="0"/>
+              <a:t>and</a:t>
+            </a:r>
+            <a:r>
+              <a:rPr lang="nl-NL" dirty="0" smtClean="0"/>
+              <a:t> </a:t>
+            </a:r>
+            <a:r>
+              <a:rPr lang="nl-NL" dirty="0" err="1" smtClean="0"/>
+              <a:t>not</a:t>
+            </a:r>
+            <a:r>
+              <a:rPr lang="nl-NL" dirty="0" smtClean="0"/>
+              <a:t> </a:t>
+            </a:r>
+            <a:r>
+              <a:rPr lang="nl-NL" dirty="0" err="1" smtClean="0"/>
+              <a:t>just</a:t>
+            </a:r>
+            <a:r>
+              <a:rPr lang="nl-NL" dirty="0" smtClean="0"/>
+              <a:t> NCBI.</a:t>
+            </a:r>
+          </a:p>
+          <a:p>
+            <a:r>
+              <a:rPr lang="nl-NL" dirty="0" smtClean="0"/>
+              <a:t>XML/JSON/TXT </a:t>
+            </a:r>
+            <a:r>
+              <a:rPr lang="nl-NL" dirty="0" err="1" smtClean="0"/>
+              <a:t>based</a:t>
+            </a:r>
+            <a:r>
+              <a:rPr lang="nl-NL" dirty="0" smtClean="0"/>
+              <a:t> exchange of information.</a:t>
+            </a:r>
+            <a:endParaRPr lang="nl-NL" dirty="0"/>
+          </a:p>
+          <a:p>
+            <a:endParaRPr lang="nl-NL" dirty="0"/>
           </a:p>
         </p:txBody>
       </p:sp>
     </p:spTree>
     <p:extLst>
       <p:ext uri="{BB962C8B-B14F-4D97-AF65-F5344CB8AC3E}">
-        <p14:creationId xmlns:p14="http://schemas.microsoft.com/office/powerpoint/2010/main" val="4211336109"/>
+        <p14:creationId xmlns:p14="http://schemas.microsoft.com/office/powerpoint/2010/main" val="102151524"/>
       </p:ext>
     </p:extLst>
   </p:cSld>
@@ -6943,13 +7081,7 @@
       </p:grpSpPr>
       <p:sp>
         <p:nvSpPr>
-          <p:cNvPr id="2" name="Title 1">
-            <a:extLst>
-              <a:ext uri="{FF2B5EF4-FFF2-40B4-BE49-F238E27FC236}">
-                <a16:creationId xmlns:a16="http://schemas.microsoft.com/office/drawing/2014/main" id="{CC8AC6DE-787B-4EEA-B1B1-5E404C85D282}"/>
-              </a:ext>
-            </a:extLst>
-          </p:cNvPr>
+          <p:cNvPr id="2" name="Title 1"/>
           <p:cNvSpPr>
             <a:spLocks noGrp="1"/>
           </p:cNvSpPr>
@@ -6963,21 +7095,20 @@
           <a:lstStyle/>
           <a:p>
             <a:r>
-              <a:rPr lang="nl-NL" dirty="0"/>
-              <a:t>Solution – In addition to POC</a:t>
-            </a:r>
-          </a:p>
-        </p:txBody>
-      </p:sp>
-      <p:sp>
-        <p:nvSpPr>
-          <p:cNvPr id="3" name="Content Placeholder 2">
-            <a:extLst>
-              <a:ext uri="{FF2B5EF4-FFF2-40B4-BE49-F238E27FC236}">
-                <a16:creationId xmlns:a16="http://schemas.microsoft.com/office/drawing/2014/main" id="{AF425634-5D54-47DE-86F2-5D4D6722D86A}"/>
-              </a:ext>
-            </a:extLst>
-          </p:cNvPr>
+              <a:rPr lang="nl-NL" dirty="0" err="1" smtClean="0"/>
+              <a:t>Further</a:t>
+            </a:r>
+            <a:r>
+              <a:rPr lang="nl-NL" dirty="0" smtClean="0"/>
+              <a:t> More…</a:t>
+            </a:r>
+            <a:endParaRPr lang="nl-NL" dirty="0"/>
+          </a:p>
+        </p:txBody>
+      </p:sp>
+      <p:sp>
+        <p:nvSpPr>
+          <p:cNvPr id="3" name="Content Placeholder 2"/>
           <p:cNvSpPr>
             <a:spLocks noGrp="1"/>
           </p:cNvSpPr>
@@ -6987,113 +7118,42 @@
         </p:nvSpPr>
         <p:spPr/>
         <p:txBody>
-          <a:bodyPr>
-            <a:normAutofit/>
-          </a:bodyPr>
-          <a:lstStyle/>
-          <a:p>
+          <a:bodyPr/>
+          <a:lstStyle/>
+          <a:p>
+            <a:r>
+              <a:rPr lang="nl-NL" dirty="0" err="1" smtClean="0"/>
+              <a:t>Enable</a:t>
+            </a:r>
             <a:r>
               <a:rPr lang="nl-NL" dirty="0" smtClean="0"/>
-              <a:t>Database.</a:t>
-            </a:r>
-          </a:p>
-          <a:p>
-            <a:r>
-              <a:rPr lang="nl-NL" dirty="0" err="1"/>
-              <a:t>Detailed</a:t>
-            </a:r>
-            <a:r>
-              <a:rPr lang="nl-NL" dirty="0"/>
-              <a:t> Information </a:t>
-            </a:r>
-            <a:r>
-              <a:rPr lang="nl-NL" dirty="0" err="1"/>
-              <a:t>about</a:t>
-            </a:r>
-            <a:r>
-              <a:rPr lang="nl-NL" dirty="0"/>
-              <a:t> </a:t>
-            </a:r>
-            <a:r>
-              <a:rPr lang="nl-NL" dirty="0" err="1"/>
+              <a:t> Intelligence in </a:t>
+            </a:r>
+            <a:r>
+              <a:rPr lang="nl-NL" dirty="0" err="1" smtClean="0"/>
               <a:t>the</a:t>
             </a:r>
             <a:r>
-              <a:rPr lang="nl-NL" dirty="0"/>
-              <a:t> </a:t>
-            </a:r>
-            <a:r>
-              <a:rPr lang="nl-NL" dirty="0" err="1"/>
-              <a:t>journals</a:t>
-            </a:r>
-            <a:r>
               <a:rPr lang="nl-NL" dirty="0" smtClean="0"/>
-              <a:t>.</a:t>
-            </a:r>
-          </a:p>
-          <a:p>
+              <a:t> Journal </a:t>
+            </a:r>
             <a:r>
               <a:rPr lang="nl-NL" dirty="0" err="1" smtClean="0"/>
-              <a:t>Pagination</a:t>
+              <a:t>Mining</a:t>
             </a:r>
             <a:r>
               <a:rPr lang="nl-NL" dirty="0" smtClean="0"/>
-              <a:t>.</a:t>
+              <a:t> Module.</a:t>
             </a:r>
           </a:p>
           <a:p>
             <a:r>
               <a:rPr lang="nl-NL" dirty="0" smtClean="0"/>
-              <a:t>Cloud Readiness.</a:t>
-            </a:r>
-            <a:endParaRPr lang="nl-NL" dirty="0"/>
-          </a:p>
-          <a:p>
-            <a:r>
-              <a:rPr lang="nl-NL" dirty="0"/>
-              <a:t>REST </a:t>
-            </a:r>
-            <a:r>
-              <a:rPr lang="nl-NL" dirty="0" err="1"/>
-              <a:t>based</a:t>
-            </a:r>
-            <a:r>
-              <a:rPr lang="nl-NL" dirty="0"/>
-              <a:t> </a:t>
+              <a:t>Understand </a:t>
             </a:r>
             <a:r>
               <a:rPr lang="nl-NL" dirty="0" err="1" smtClean="0"/>
-              <a:t>endpoint</a:t>
-            </a:r>
-            <a:r>
-              <a:rPr lang="nl-NL" dirty="0" smtClean="0"/>
-              <a:t>.</a:t>
-            </a:r>
-            <a:endParaRPr lang="nl-NL" dirty="0"/>
-          </a:p>
-          <a:p>
-            <a:pPr lvl="1"/>
-            <a:r>
-              <a:rPr lang="nl-NL" dirty="0"/>
-              <a:t>So existing application(Lab) can also connect </a:t>
-            </a:r>
-            <a:r>
-              <a:rPr lang="nl-NL" dirty="0" err="1"/>
-              <a:t>to</a:t>
-            </a:r>
-            <a:r>
-              <a:rPr lang="nl-NL" dirty="0" smtClean="0"/>
-              <a:t>.</a:t>
-            </a:r>
-          </a:p>
-          <a:p>
-            <a:r>
-              <a:rPr lang="nl-NL" dirty="0" smtClean="0"/>
-              <a:t>Solution </a:t>
-            </a:r>
-            <a:r>
-              <a:rPr lang="nl-NL" dirty="0" err="1" smtClean="0"/>
-              <a:t>will</a:t>
+              <a:t>the</a:t>
             </a:r>
             <a:r>
               <a:rPr lang="nl-NL" dirty="0" smtClean="0"/>
@@ -7101,15 +7161,7 @@
             </a:r>
             <a:r>
               <a:rPr lang="nl-NL" dirty="0" err="1" smtClean="0"/>
-              <a:t>be</a:t>
-            </a:r>
-            <a:r>
-              <a:rPr lang="nl-NL" dirty="0" smtClean="0"/>
-              <a:t> a API </a:t>
-            </a:r>
-            <a:r>
-              <a:rPr lang="nl-NL" dirty="0" err="1" smtClean="0"/>
-              <a:t>which</a:t>
+              <a:t>Methods</a:t>
             </a:r>
             <a:r>
               <a:rPr lang="nl-NL" dirty="0" smtClean="0"/>
@@ -7117,7 +7169,7 @@
             </a:r>
             <a:r>
               <a:rPr lang="nl-NL" dirty="0" err="1" smtClean="0"/>
-              <a:t>can</a:t>
+              <a:t>and</a:t>
             </a:r>
             <a:r>
               <a:rPr lang="nl-NL" dirty="0" smtClean="0"/>
@@ -7125,7 +7177,7 @@
             </a:r>
             <a:r>
               <a:rPr lang="nl-NL" dirty="0" err="1" smtClean="0"/>
-              <a:t>be</a:t>
+              <a:t>identify</a:t>
             </a:r>
             <a:r>
               <a:rPr lang="nl-NL" dirty="0" smtClean="0"/>
@@ -7133,69 +7185,26 @@
             </a:r>
             <a:r>
               <a:rPr lang="nl-NL" dirty="0" err="1" smtClean="0"/>
-              <a:t>extended</a:t>
+              <a:t>Products</a:t>
             </a:r>
             <a:r>
               <a:rPr lang="nl-NL" dirty="0" smtClean="0"/>
-              <a:t> </a:t>
+              <a:t>, Brands, </a:t>
             </a:r>
             <a:r>
               <a:rPr lang="nl-NL" dirty="0" err="1" smtClean="0"/>
-              <a:t>to</a:t>
+              <a:t>possibly</a:t>
             </a:r>
             <a:r>
               <a:rPr lang="nl-NL" dirty="0" smtClean="0"/>
-              <a:t> multiple </a:t>
-            </a:r>
-            <a:r>
-              <a:rPr lang="nl-NL" dirty="0" err="1" smtClean="0"/>
-              <a:t>Journals</a:t>
-            </a:r>
+              <a:t> more!</a:t>
+            </a:r>
+          </a:p>
+          <a:p>
             <a:r>
               <a:rPr lang="nl-NL" dirty="0" smtClean="0"/>
-              <a:t>, </a:t>
-            </a:r>
-            <a:r>
-              <a:rPr lang="nl-NL" dirty="0" err="1" smtClean="0"/>
-              <a:t>and</a:t>
-            </a:r>
-            <a:r>
-              <a:rPr lang="nl-NL" dirty="0" smtClean="0"/>
-              <a:t> </a:t>
-            </a:r>
-            <a:r>
-              <a:rPr lang="nl-NL" dirty="0" err="1" smtClean="0"/>
-              <a:t>not</a:t>
-            </a:r>
-            <a:r>
-              <a:rPr lang="nl-NL" dirty="0" smtClean="0"/>
-              <a:t> </a:t>
-            </a:r>
-            <a:r>
-              <a:rPr lang="nl-NL" dirty="0" err="1" smtClean="0"/>
-              <a:t>just</a:t>
-            </a:r>
-            <a:r>
-              <a:rPr lang="nl-NL" dirty="0" smtClean="0"/>
-              <a:t> NCBI.</a:t>
-            </a:r>
-          </a:p>
-          <a:p>
-            <a:r>
-              <a:rPr lang="nl-NL" dirty="0" smtClean="0"/>
-              <a:t>XML/JSON/TXT </a:t>
-            </a:r>
-            <a:r>
-              <a:rPr lang="nl-NL" dirty="0" err="1" smtClean="0"/>
-              <a:t>based</a:t>
-            </a:r>
-            <a:r>
-              <a:rPr lang="nl-NL" dirty="0" smtClean="0"/>
-              <a:t> exchange of information.</a:t>
-            </a:r>
-            <a:endParaRPr lang="nl-NL" dirty="0"/>
-          </a:p>
-          <a:p>
+              <a:t>A bit of Machine Learning….</a:t>
+            </a:r>
             <a:endParaRPr lang="nl-NL" dirty="0"/>
           </a:p>
         </p:txBody>
@@ -7203,7 +7212,7 @@
     </p:spTree>
     <p:extLst>
       <p:ext uri="{BB962C8B-B14F-4D97-AF65-F5344CB8AC3E}">
-        <p14:creationId xmlns:p14="http://schemas.microsoft.com/office/powerpoint/2010/main" val="102151524"/>
+        <p14:creationId xmlns:p14="http://schemas.microsoft.com/office/powerpoint/2010/main" val="3125934338"/>
       </p:ext>
     </p:extLst>
   </p:cSld>
@@ -7247,130 +7256,47 @@
             <p:ph type="title"/>
           </p:nvPr>
         </p:nvSpPr>
-        <p:spPr/>
-        <p:txBody>
-          <a:bodyPr/>
-          <a:lstStyle/>
-          <a:p>
+        <p:spPr>
+          <a:xfrm>
+            <a:off x="1485693" y="2447769"/>
+            <a:ext cx="9404723" cy="1400530"/>
+          </a:xfrm>
+        </p:spPr>
+        <p:txBody>
+          <a:bodyPr/>
+          <a:lstStyle/>
+          <a:p>
+            <a:pPr algn="ctr"/>
             <a:r>
               <a:rPr lang="nl-NL" dirty="0" err="1" smtClean="0"/>
-              <a:t>Further</a:t>
+              <a:t>Thoughts</a:t>
             </a:r>
             <a:r>
               <a:rPr lang="nl-NL" dirty="0" smtClean="0"/>
-              <a:t> More…</a:t>
-            </a:r>
-            <a:endParaRPr lang="nl-NL" dirty="0"/>
-          </a:p>
-        </p:txBody>
-      </p:sp>
-      <p:sp>
-        <p:nvSpPr>
-          <p:cNvPr id="3" name="Content Placeholder 2"/>
-          <p:cNvSpPr>
-            <a:spLocks noGrp="1"/>
-          </p:cNvSpPr>
-          <p:nvPr>
-            <p:ph idx="1"/>
-          </p:nvPr>
-        </p:nvSpPr>
-        <p:spPr/>
-        <p:txBody>
-          <a:bodyPr/>
-          <a:lstStyle/>
-          <a:p>
-            <a:r>
-              <a:rPr lang="nl-NL" dirty="0" err="1" smtClean="0"/>
-              <a:t>Enable</a:t>
-            </a:r>
-            <a:r>
+              <a:t>?</a:t>
+            </a:r>
+            <a:br>
               <a:rPr lang="nl-NL" dirty="0" smtClean="0"/>
-              <a:t> Intelligence in </a:t>
-            </a:r>
-            <a:r>
-              <a:rPr lang="nl-NL" dirty="0" err="1" smtClean="0"/>
-              <a:t>the</a:t>
-            </a:r>
+            </a:br>
             <a:r>
               <a:rPr lang="nl-NL" dirty="0" smtClean="0"/>
-              <a:t> Journal </a:t>
-            </a:r>
-            <a:r>
-              <a:rPr lang="nl-NL" dirty="0" err="1" smtClean="0"/>
-              <a:t>Mining</a:t>
-            </a:r>
-            <a:r>
+              <a:t/>
+            </a:r>
+            <a:br>
               <a:rPr lang="nl-NL" dirty="0" smtClean="0"/>
-              <a:t> Module.</a:t>
-            </a:r>
-          </a:p>
-          <a:p>
-            <a:r>
-              <a:rPr lang="nl-NL" dirty="0" smtClean="0"/>
-              <a:t>Understand </a:t>
-            </a:r>
-            <a:r>
-              <a:rPr lang="nl-NL" dirty="0" err="1" smtClean="0"/>
-              <a:t>the</a:t>
-            </a:r>
-            <a:r>
-              <a:rPr lang="nl-NL" dirty="0" smtClean="0"/>
-              <a:t> </a:t>
-            </a:r>
-            <a:r>
-              <a:rPr lang="nl-NL" dirty="0" err="1" smtClean="0"/>
-              <a:t>Methods</a:t>
-            </a:r>
-            <a:r>
-              <a:rPr lang="nl-NL" dirty="0" smtClean="0"/>
-              <a:t> </a:t>
-            </a:r>
-            <a:r>
-              <a:rPr lang="nl-NL" dirty="0" err="1" smtClean="0"/>
-              <a:t>and</a:t>
-            </a:r>
-            <a:r>
-              <a:rPr lang="nl-NL" dirty="0" smtClean="0"/>
-              <a:t> </a:t>
-            </a:r>
-            <a:r>
-              <a:rPr lang="nl-NL" dirty="0" err="1" smtClean="0"/>
-              <a:t>identify</a:t>
-            </a:r>
-            <a:r>
-              <a:rPr lang="nl-NL" dirty="0" smtClean="0"/>
-              <a:t> </a:t>
-            </a:r>
-            <a:r>
-              <a:rPr lang="nl-NL" dirty="0" err="1" smtClean="0"/>
-              <a:t>Products</a:t>
-            </a:r>
-            <a:r>
-              <a:rPr lang="nl-NL" dirty="0" smtClean="0"/>
-              <a:t>, Brands, </a:t>
-            </a:r>
-            <a:r>
-              <a:rPr lang="nl-NL" dirty="0" err="1" smtClean="0"/>
-              <a:t>possibly</a:t>
-            </a:r>
-            <a:r>
-              <a:rPr lang="nl-NL" dirty="0" smtClean="0"/>
-              <a:t> more!</a:t>
-            </a:r>
-          </a:p>
-          <a:p>
-            <a:r>
-              <a:rPr lang="nl-NL" dirty="0" smtClean="0"/>
-              <a:t>A bit of Machine Learning….</a:t>
-            </a:r>
-            <a:endParaRPr lang="nl-NL" dirty="0"/>
+            </a:br>
+            <a:r>
+              <a:rPr lang="nl-NL" sz="1600" dirty="0" smtClean="0"/>
+              <a:t>ravishbhupesh@gmail.com</a:t>
+            </a:r>
+            <a:endParaRPr lang="nl-NL" sz="1600" dirty="0"/>
           </a:p>
         </p:txBody>
       </p:sp>
     </p:spTree>
     <p:extLst>
       <p:ext uri="{BB962C8B-B14F-4D97-AF65-F5344CB8AC3E}">
-        <p14:creationId xmlns:p14="http://schemas.microsoft.com/office/powerpoint/2010/main" val="3125934338"/>
+        <p14:creationId xmlns:p14="http://schemas.microsoft.com/office/powerpoint/2010/main" val="1438573049"/>
       </p:ext>
     </p:extLst>
   </p:cSld>

</xml_diff>